<commit_message>
added logo to presentations
</commit_message>
<xml_diff>
--- a/doc/intro.pptx
+++ b/doc/intro.pptx
@@ -5,7 +5,7 @@
     <p:sldMasterId id="2147483660" r:id="rId1"/>
   </p:sldMasterIdLst>
   <p:sldIdLst>
-    <p:sldId id="256" r:id="rId2"/>
+    <p:sldId id="258" r:id="rId2"/>
     <p:sldId id="257" r:id="rId3"/>
   </p:sldIdLst>
   <p:sldSz cx="9144000" cy="6858000" type="screen4x3"/>
@@ -105,6 +105,22 @@
       </a:defRPr>
     </a:lvl9pPr>
   </p:defaultTextStyle>
+  <p:extLst>
+    <p:ext uri="{EFAFB233-063F-42B5-8137-9DF3F51BA10A}">
+      <p15:sldGuideLst xmlns:p15="http://schemas.microsoft.com/office/powerpoint/2012/main">
+        <p15:guide id="1" orient="horz" pos="2160">
+          <p15:clr>
+            <a:srgbClr val="A4A3A4"/>
+          </p15:clr>
+        </p15:guide>
+        <p15:guide id="2" pos="2880">
+          <p15:clr>
+            <a:srgbClr val="A4A3A4"/>
+          </p15:clr>
+        </p15:guide>
+      </p15:sldGuideLst>
+    </p:ext>
+  </p:extLst>
 </p:presentation>
 </file>
 
@@ -329,7 +345,7 @@
           <a:p>
             <a:fld id="{DD69020F-A873-CE4F-8EB1-3F1D6F7B8CD4}" type="datetimeFigureOut">
               <a:rPr lang="de-DE" smtClean="0"/>
-              <a:t>27.05.14</a:t>
+              <a:t>27.05.2014</a:t>
             </a:fld>
             <a:endParaRPr lang="de-DE"/>
           </a:p>
@@ -661,7 +677,7 @@
           <a:p>
             <a:fld id="{DD69020F-A873-CE4F-8EB1-3F1D6F7B8CD4}" type="datetimeFigureOut">
               <a:rPr lang="de-DE" smtClean="0"/>
-              <a:t>27.05.14</a:t>
+              <a:t>27.05.2014</a:t>
             </a:fld>
             <a:endParaRPr lang="de-DE"/>
           </a:p>
@@ -993,7 +1009,7 @@
           <a:p>
             <a:fld id="{DD69020F-A873-CE4F-8EB1-3F1D6F7B8CD4}" type="datetimeFigureOut">
               <a:rPr lang="de-DE" smtClean="0"/>
-              <a:t>27.05.14</a:t>
+              <a:t>27.05.2014</a:t>
             </a:fld>
             <a:endParaRPr lang="de-DE"/>
           </a:p>
@@ -1325,7 +1341,7 @@
           <a:p>
             <a:fld id="{DD69020F-A873-CE4F-8EB1-3F1D6F7B8CD4}" type="datetimeFigureOut">
               <a:rPr lang="de-DE" smtClean="0"/>
-              <a:t>27.05.14</a:t>
+              <a:t>27.05.2014</a:t>
             </a:fld>
             <a:endParaRPr lang="de-DE"/>
           </a:p>
@@ -2014,7 +2030,7 @@
           <a:p>
             <a:fld id="{DD69020F-A873-CE4F-8EB1-3F1D6F7B8CD4}" type="datetimeFigureOut">
               <a:rPr lang="de-DE" smtClean="0"/>
-              <a:t>27.05.14</a:t>
+              <a:t>27.05.2014</a:t>
             </a:fld>
             <a:endParaRPr lang="de-DE"/>
           </a:p>
@@ -2193,7 +2209,7 @@
           <a:p>
             <a:fld id="{DD69020F-A873-CE4F-8EB1-3F1D6F7B8CD4}" type="datetimeFigureOut">
               <a:rPr lang="de-DE" smtClean="0"/>
-              <a:t>27.05.14</a:t>
+              <a:t>27.05.2014</a:t>
             </a:fld>
             <a:endParaRPr lang="de-DE"/>
           </a:p>
@@ -2367,7 +2383,7 @@
           <a:p>
             <a:fld id="{DD69020F-A873-CE4F-8EB1-3F1D6F7B8CD4}" type="datetimeFigureOut">
               <a:rPr lang="de-DE" smtClean="0"/>
-              <a:t>27.05.14</a:t>
+              <a:t>27.05.2014</a:t>
             </a:fld>
             <a:endParaRPr lang="de-DE"/>
           </a:p>
@@ -2615,7 +2631,7 @@
           <a:p>
             <a:fld id="{DD69020F-A873-CE4F-8EB1-3F1D6F7B8CD4}" type="datetimeFigureOut">
               <a:rPr lang="de-DE" smtClean="0"/>
-              <a:t>27.05.14</a:t>
+              <a:t>27.05.2014</a:t>
             </a:fld>
             <a:endParaRPr lang="de-DE"/>
           </a:p>
@@ -2945,7 +2961,7 @@
           <a:p>
             <a:fld id="{DD69020F-A873-CE4F-8EB1-3F1D6F7B8CD4}" type="datetimeFigureOut">
               <a:rPr lang="de-DE" smtClean="0"/>
-              <a:t>27.05.14</a:t>
+              <a:t>27.05.2014</a:t>
             </a:fld>
             <a:endParaRPr lang="de-DE"/>
           </a:p>
@@ -3237,7 +3253,7 @@
           <a:p>
             <a:fld id="{DD69020F-A873-CE4F-8EB1-3F1D6F7B8CD4}" type="datetimeFigureOut">
               <a:rPr lang="de-DE" smtClean="0"/>
-              <a:t>27.05.14</a:t>
+              <a:t>27.05.2014</a:t>
             </a:fld>
             <a:endParaRPr lang="de-DE"/>
           </a:p>
@@ -3673,7 +3689,7 @@
           <a:p>
             <a:fld id="{DD69020F-A873-CE4F-8EB1-3F1D6F7B8CD4}" type="datetimeFigureOut">
               <a:rPr lang="de-DE" smtClean="0"/>
-              <a:t>27.05.14</a:t>
+              <a:t>27.05.2014</a:t>
             </a:fld>
             <a:endParaRPr lang="de-DE"/>
           </a:p>
@@ -3860,7 +3876,7 @@
           <a:p>
             <a:fld id="{DD69020F-A873-CE4F-8EB1-3F1D6F7B8CD4}" type="datetimeFigureOut">
               <a:rPr lang="de-DE" smtClean="0"/>
-              <a:t>27.05.14</a:t>
+              <a:t>27.05.2014</a:t>
             </a:fld>
             <a:endParaRPr lang="de-DE"/>
           </a:p>
@@ -3950,7 +3966,7 @@
           <a:p>
             <a:fld id="{DD69020F-A873-CE4F-8EB1-3F1D6F7B8CD4}" type="datetimeFigureOut">
               <a:rPr lang="de-DE" smtClean="0"/>
-              <a:t>27.05.14</a:t>
+              <a:t>27.05.2014</a:t>
             </a:fld>
             <a:endParaRPr lang="de-DE"/>
           </a:p>
@@ -4231,7 +4247,7 @@
           <a:p>
             <a:fld id="{DD69020F-A873-CE4F-8EB1-3F1D6F7B8CD4}" type="datetimeFigureOut">
               <a:rPr lang="de-DE" smtClean="0"/>
-              <a:t>27.05.14</a:t>
+              <a:t>27.05.2014</a:t>
             </a:fld>
             <a:endParaRPr lang="de-DE"/>
           </a:p>
@@ -4446,7 +4462,7 @@
           <a:p>
             <a:fld id="{DD69020F-A873-CE4F-8EB1-3F1D6F7B8CD4}" type="datetimeFigureOut">
               <a:rPr lang="de-DE" smtClean="0"/>
-              <a:t>27.05.14</a:t>
+              <a:t>27.05.2014</a:t>
             </a:fld>
             <a:endParaRPr lang="de-DE"/>
           </a:p>
@@ -4931,13 +4947,18 @@
             <p:ph type="ctrTitle"/>
           </p:nvPr>
         </p:nvSpPr>
-        <p:spPr/>
+        <p:spPr>
+          <a:xfrm>
+            <a:off x="685800" y="1446051"/>
+            <a:ext cx="7772400" cy="978408"/>
+          </a:xfrm>
+        </p:spPr>
         <p:txBody>
           <a:bodyPr/>
           <a:lstStyle/>
           <a:p>
             <a:r>
-              <a:rPr lang="de-DE" dirty="0" err="1" smtClean="0"/>
+              <a:rPr lang="de-DE" dirty="0" smtClean="0"/>
               <a:t>PresIt</a:t>
             </a:r>
             <a:endParaRPr lang="de-DE" dirty="0"/>
@@ -4954,7 +4975,12 @@
             <p:ph type="subTitle" idx="1"/>
           </p:nvPr>
         </p:nvSpPr>
-        <p:spPr/>
+        <p:spPr>
+          <a:xfrm>
+            <a:off x="685800" y="2376546"/>
+            <a:ext cx="7772400" cy="877824"/>
+          </a:xfrm>
+        </p:spPr>
         <p:txBody>
           <a:bodyPr/>
           <a:lstStyle/>
@@ -5238,21 +5264,306 @@
           </a:lstStyle>
           <a:p>
             <a:r>
-              <a:rPr lang="fi-FI" dirty="0" err="1" smtClean="0"/>
+              <a:rPr lang="fi-FI" dirty="0" smtClean="0"/>
               <a:t>github.com</a:t>
             </a:r>
             <a:r>
-              <a:rPr lang="fi-FI" dirty="0" err="1"/>
+              <a:rPr lang="fi-FI" dirty="0"/>
               <a:t>/rknoll/presit</a:t>
             </a:r>
             <a:endParaRPr lang="de-DE" dirty="0"/>
           </a:p>
         </p:txBody>
       </p:sp>
+      <p:sp>
+        <p:nvSpPr>
+          <p:cNvPr id="6" name="Untertitel 2"/>
+          <p:cNvSpPr txBox="1">
+            <a:spLocks/>
+          </p:cNvSpPr>
+          <p:nvPr/>
+        </p:nvSpPr>
+        <p:spPr>
+          <a:xfrm>
+            <a:off x="504387" y="5534163"/>
+            <a:ext cx="3305324" cy="899901"/>
+          </a:xfrm>
+          <a:prstGeom prst="rect">
+            <a:avLst/>
+          </a:prstGeom>
+        </p:spPr>
+        <p:txBody>
+          <a:bodyPr vert="horz" lIns="91440" tIns="45720" rIns="91440" bIns="45720" rtlCol="0">
+            <a:normAutofit/>
+          </a:bodyPr>
+          <a:lstStyle>
+            <a:lvl1pPr marL="0" indent="0" algn="ctr" defTabSz="914400" rtl="0" eaLnBrk="1" latinLnBrk="0" hangingPunct="1">
+              <a:spcBef>
+                <a:spcPts val="300"/>
+              </a:spcBef>
+              <a:buFontTx/>
+              <a:buNone/>
+              <a:defRPr sz="2000" kern="1200">
+                <a:solidFill>
+                  <a:schemeClr val="tx1">
+                    <a:tint val="75000"/>
+                  </a:schemeClr>
+                </a:solidFill>
+                <a:effectLst>
+                  <a:outerShdw blurRad="50800" dist="50800" dir="5400000" sx="101000" sy="101000" algn="t" rotWithShape="0">
+                    <a:prstClr val="black">
+                      <a:alpha val="40000"/>
+                    </a:prstClr>
+                  </a:outerShdw>
+                </a:effectLst>
+                <a:latin typeface="+mn-lt"/>
+                <a:ea typeface="+mn-ea"/>
+                <a:cs typeface="+mn-cs"/>
+              </a:defRPr>
+            </a:lvl1pPr>
+            <a:lvl2pPr marL="457200" indent="0" algn="ctr" defTabSz="914400" rtl="0" eaLnBrk="1" latinLnBrk="0" hangingPunct="1">
+              <a:spcBef>
+                <a:spcPts val="600"/>
+              </a:spcBef>
+              <a:buFontTx/>
+              <a:buNone/>
+              <a:defRPr sz="2000" kern="1200">
+                <a:solidFill>
+                  <a:schemeClr val="tx1">
+                    <a:tint val="75000"/>
+                  </a:schemeClr>
+                </a:solidFill>
+                <a:effectLst>
+                  <a:outerShdw blurRad="50800" dist="50800" dir="5400000" sx="101000" sy="101000" algn="t" rotWithShape="0">
+                    <a:prstClr val="black">
+                      <a:alpha val="40000"/>
+                    </a:prstClr>
+                  </a:outerShdw>
+                </a:effectLst>
+                <a:latin typeface="+mn-lt"/>
+                <a:ea typeface="+mn-ea"/>
+                <a:cs typeface="+mn-cs"/>
+              </a:defRPr>
+            </a:lvl2pPr>
+            <a:lvl3pPr marL="914400" indent="0" algn="ctr" defTabSz="914400" rtl="0" eaLnBrk="1" latinLnBrk="0" hangingPunct="1">
+              <a:spcBef>
+                <a:spcPts val="600"/>
+              </a:spcBef>
+              <a:buFontTx/>
+              <a:buNone/>
+              <a:defRPr sz="1800" kern="1200">
+                <a:solidFill>
+                  <a:schemeClr val="tx1">
+                    <a:tint val="75000"/>
+                  </a:schemeClr>
+                </a:solidFill>
+                <a:effectLst>
+                  <a:outerShdw blurRad="50800" dist="50800" dir="5400000" sx="101000" sy="101000" algn="t" rotWithShape="0">
+                    <a:prstClr val="black">
+                      <a:alpha val="40000"/>
+                    </a:prstClr>
+                  </a:outerShdw>
+                </a:effectLst>
+                <a:latin typeface="+mn-lt"/>
+                <a:ea typeface="+mn-ea"/>
+                <a:cs typeface="+mn-cs"/>
+              </a:defRPr>
+            </a:lvl3pPr>
+            <a:lvl4pPr marL="1371600" indent="0" algn="ctr" defTabSz="914400" rtl="0" eaLnBrk="1" latinLnBrk="0" hangingPunct="1">
+              <a:spcBef>
+                <a:spcPts val="600"/>
+              </a:spcBef>
+              <a:buFontTx/>
+              <a:buNone/>
+              <a:defRPr sz="1800" kern="1200">
+                <a:solidFill>
+                  <a:schemeClr val="tx1">
+                    <a:tint val="75000"/>
+                  </a:schemeClr>
+                </a:solidFill>
+                <a:effectLst>
+                  <a:outerShdw blurRad="50800" dist="50800" dir="5400000" sx="101000" sy="101000" algn="t" rotWithShape="0">
+                    <a:prstClr val="black">
+                      <a:alpha val="40000"/>
+                    </a:prstClr>
+                  </a:outerShdw>
+                </a:effectLst>
+                <a:latin typeface="+mn-lt"/>
+                <a:ea typeface="+mn-ea"/>
+                <a:cs typeface="+mn-cs"/>
+              </a:defRPr>
+            </a:lvl4pPr>
+            <a:lvl5pPr marL="1828800" indent="0" algn="ctr" defTabSz="914400" rtl="0" eaLnBrk="1" latinLnBrk="0" hangingPunct="1">
+              <a:spcBef>
+                <a:spcPts val="600"/>
+              </a:spcBef>
+              <a:buFontTx/>
+              <a:buNone/>
+              <a:defRPr sz="1800" kern="1200">
+                <a:solidFill>
+                  <a:schemeClr val="tx1">
+                    <a:tint val="75000"/>
+                  </a:schemeClr>
+                </a:solidFill>
+                <a:effectLst>
+                  <a:outerShdw blurRad="50800" dist="50800" dir="5400000" sx="101000" sy="101000" algn="t" rotWithShape="0">
+                    <a:prstClr val="black">
+                      <a:alpha val="40000"/>
+                    </a:prstClr>
+                  </a:outerShdw>
+                </a:effectLst>
+                <a:latin typeface="+mn-lt"/>
+                <a:ea typeface="+mn-ea"/>
+                <a:cs typeface="+mn-cs"/>
+              </a:defRPr>
+            </a:lvl5pPr>
+            <a:lvl6pPr marL="2286000" indent="0" algn="ctr" defTabSz="914400" rtl="0" eaLnBrk="1" latinLnBrk="0" hangingPunct="1">
+              <a:spcBef>
+                <a:spcPct val="20000"/>
+              </a:spcBef>
+              <a:buFontTx/>
+              <a:buNone/>
+              <a:defRPr lang="en-US" sz="1800" kern="1200">
+                <a:solidFill>
+                  <a:schemeClr val="tx1">
+                    <a:tint val="75000"/>
+                  </a:schemeClr>
+                </a:solidFill>
+                <a:effectLst>
+                  <a:outerShdw blurRad="50800" dist="50800" dir="5400000" sx="101000" sy="101000" algn="t" rotWithShape="0">
+                    <a:prstClr val="black">
+                      <a:alpha val="40000"/>
+                    </a:prstClr>
+                  </a:outerShdw>
+                </a:effectLst>
+                <a:latin typeface="+mn-lt"/>
+                <a:ea typeface="+mn-ea"/>
+                <a:cs typeface="+mn-cs"/>
+              </a:defRPr>
+            </a:lvl6pPr>
+            <a:lvl7pPr marL="2743200" indent="0" algn="ctr" defTabSz="914400" rtl="0" eaLnBrk="1" latinLnBrk="0" hangingPunct="1">
+              <a:spcBef>
+                <a:spcPct val="20000"/>
+              </a:spcBef>
+              <a:buFontTx/>
+              <a:buNone/>
+              <a:defRPr lang="en-US" sz="1800" kern="1200">
+                <a:solidFill>
+                  <a:schemeClr val="tx1">
+                    <a:tint val="75000"/>
+                  </a:schemeClr>
+                </a:solidFill>
+                <a:effectLst>
+                  <a:outerShdw blurRad="50800" dist="50800" dir="5400000" sx="101000" sy="101000" algn="t" rotWithShape="0">
+                    <a:prstClr val="black">
+                      <a:alpha val="40000"/>
+                    </a:prstClr>
+                  </a:outerShdw>
+                </a:effectLst>
+                <a:latin typeface="+mn-lt"/>
+                <a:ea typeface="+mn-ea"/>
+                <a:cs typeface="+mn-cs"/>
+              </a:defRPr>
+            </a:lvl7pPr>
+            <a:lvl8pPr marL="3200400" indent="0" algn="ctr" defTabSz="914400" rtl="0" eaLnBrk="1" latinLnBrk="0" hangingPunct="1">
+              <a:spcBef>
+                <a:spcPct val="20000"/>
+              </a:spcBef>
+              <a:buFontTx/>
+              <a:buNone/>
+              <a:defRPr lang="en-US" sz="1800" kern="1200">
+                <a:solidFill>
+                  <a:schemeClr val="tx1">
+                    <a:tint val="75000"/>
+                  </a:schemeClr>
+                </a:solidFill>
+                <a:effectLst>
+                  <a:outerShdw blurRad="50800" dist="50800" dir="5400000" sx="101000" sy="101000" algn="t" rotWithShape="0">
+                    <a:prstClr val="black">
+                      <a:alpha val="40000"/>
+                    </a:prstClr>
+                  </a:outerShdw>
+                </a:effectLst>
+                <a:latin typeface="+mn-lt"/>
+                <a:ea typeface="+mn-ea"/>
+                <a:cs typeface="+mn-cs"/>
+              </a:defRPr>
+            </a:lvl8pPr>
+            <a:lvl9pPr marL="3657600" indent="0" algn="ctr" defTabSz="914400" rtl="0" eaLnBrk="1" latinLnBrk="0" hangingPunct="1">
+              <a:spcBef>
+                <a:spcPct val="20000"/>
+              </a:spcBef>
+              <a:buFontTx/>
+              <a:buNone/>
+              <a:defRPr lang="en-US" sz="1800" kern="1200">
+                <a:solidFill>
+                  <a:schemeClr val="tx1">
+                    <a:tint val="75000"/>
+                  </a:schemeClr>
+                </a:solidFill>
+                <a:effectLst>
+                  <a:outerShdw blurRad="50800" dist="50800" dir="5400000" sx="101000" sy="101000" algn="t" rotWithShape="0">
+                    <a:prstClr val="black">
+                      <a:alpha val="40000"/>
+                    </a:prstClr>
+                  </a:outerShdw>
+                </a:effectLst>
+                <a:latin typeface="+mn-lt"/>
+                <a:ea typeface="+mn-ea"/>
+                <a:cs typeface="+mn-cs"/>
+              </a:defRPr>
+            </a:lvl9pPr>
+          </a:lstStyle>
+          <a:p>
+            <a:pPr algn="l"/>
+            <a:r>
+              <a:rPr lang="en-US" sz="2400" dirty="0" smtClean="0"/>
+              <a:t>Richard Knoll</a:t>
+            </a:r>
+          </a:p>
+          <a:p>
+            <a:pPr algn="l"/>
+            <a:r>
+              <a:rPr lang="en-US" sz="2400" dirty="0" smtClean="0"/>
+              <a:t>Florian Nairz</a:t>
+            </a:r>
+          </a:p>
+        </p:txBody>
+      </p:sp>
+      <p:pic>
+        <p:nvPicPr>
+          <p:cNvPr id="4" name="Grafik 3"/>
+          <p:cNvPicPr>
+            <a:picLocks noChangeAspect="1"/>
+          </p:cNvPicPr>
+          <p:nvPr/>
+        </p:nvPicPr>
+        <p:blipFill>
+          <a:blip r:embed="rId3">
+            <a:extLst>
+              <a:ext uri="{28A0092B-C50C-407E-A947-70E740481C1C}">
+                <a14:useLocalDpi xmlns:a14="http://schemas.microsoft.com/office/drawing/2010/main" val="0"/>
+              </a:ext>
+            </a:extLst>
+          </a:blip>
+          <a:stretch>
+            <a:fillRect/>
+          </a:stretch>
+        </p:blipFill>
+        <p:spPr>
+          <a:xfrm>
+            <a:off x="3771437" y="3079170"/>
+            <a:ext cx="1601126" cy="1601126"/>
+          </a:xfrm>
+          <a:prstGeom prst="rect">
+            <a:avLst/>
+          </a:prstGeom>
+        </p:spPr>
+      </p:pic>
     </p:spTree>
     <p:extLst>
       <p:ext uri="{BB962C8B-B14F-4D97-AF65-F5344CB8AC3E}">
-        <p14:creationId xmlns:p14="http://schemas.microsoft.com/office/powerpoint/2010/main" val="2408256625"/>
+        <p14:creationId xmlns:p14="http://schemas.microsoft.com/office/powerpoint/2010/main" val="2522881806"/>
       </p:ext>
     </p:extLst>
   </p:cSld>
@@ -5262,7 +5573,7 @@
   <p:timing>
     <p:tnLst>
       <p:par>
-        <p:cTn xmlns:p14="http://schemas.microsoft.com/office/powerpoint/2010/main" id="1" dur="indefinite" restart="never" nodeType="tmRoot"/>
+        <p:cTn id="1" dur="indefinite" restart="never" nodeType="tmRoot"/>
       </p:par>
     </p:tnLst>
   </p:timing>
@@ -5604,7 +5915,7 @@
   <p:timing>
     <p:tnLst>
       <p:par>
-        <p:cTn xmlns:p14="http://schemas.microsoft.com/office/powerpoint/2010/main" id="1" dur="indefinite" restart="never" nodeType="tmRoot"/>
+        <p:cTn id="1" dur="indefinite" restart="never" nodeType="tmRoot"/>
       </p:par>
     </p:tnLst>
   </p:timing>

</xml_diff>